<commit_message>
added AI Consoles pdf
</commit_message>
<xml_diff>
--- a/documents/AI Agents.pptx
+++ b/documents/AI Agents.pptx
@@ -112,6 +112,11 @@
       </a:defRPr>
     </a:lvl9pPr>
   </p:defaultTextStyle>
+  <p:extLst>
+    <p:ext uri="{EFAFB233-063F-42B5-8137-9DF3F51BA10A}">
+      <p15:sldGuideLst xmlns:p15="http://schemas.microsoft.com/office/powerpoint/2012/main"/>
+    </p:ext>
+  </p:extLst>
 </p:presentation>
 </file>
 
@@ -121,6 +126,35 @@
     <p1510:client id="{DC4650A2-E07E-40E8-AA9C-41C3501B3C82}" v="2" dt="2026-02-12T00:51:28.906"/>
   </p1510:revLst>
 </p1510:revInfo>
+</file>
+
+<file path=ppt/changesInfos/changesInfo1.xml><?xml version="1.0" encoding="utf-8"?>
+<pc:chgInfo xmlns:a="http://schemas.openxmlformats.org/drawingml/2006/main" xmlns:r="http://schemas.openxmlformats.org/officeDocument/2006/relationships" xmlns:ac="http://schemas.microsoft.com/office/drawing/2013/main/command" xmlns:pc="http://schemas.microsoft.com/office/powerpoint/2013/main/command">
+  <pc:docChgLst>
+    <pc:chgData name="James Fawcett" userId="8e51e0eb5f6d7f4b" providerId="LiveId" clId="{48D2E37E-D3D9-42CB-B0B1-D930C960B035}"/>
+    <pc:docChg chg="custSel modSld">
+      <pc:chgData name="James Fawcett" userId="8e51e0eb5f6d7f4b" providerId="LiveId" clId="{48D2E37E-D3D9-42CB-B0B1-D930C960B035}" dt="2026-02-12T18:50:04.743" v="308" actId="20577"/>
+      <pc:docMkLst>
+        <pc:docMk/>
+      </pc:docMkLst>
+      <pc:sldChg chg="modSp mod">
+        <pc:chgData name="James Fawcett" userId="8e51e0eb5f6d7f4b" providerId="LiveId" clId="{48D2E37E-D3D9-42CB-B0B1-D930C960B035}" dt="2026-02-12T18:50:04.743" v="308" actId="20577"/>
+        <pc:sldMkLst>
+          <pc:docMk/>
+          <pc:sldMk cId="1325313856" sldId="261"/>
+        </pc:sldMkLst>
+        <pc:spChg chg="mod">
+          <ac:chgData name="James Fawcett" userId="8e51e0eb5f6d7f4b" providerId="LiveId" clId="{48D2E37E-D3D9-42CB-B0B1-D930C960B035}" dt="2026-02-12T18:50:04.743" v="308" actId="20577"/>
+          <ac:spMkLst>
+            <pc:docMk/>
+            <pc:sldMk cId="1325313856" sldId="261"/>
+            <ac:spMk id="3" creationId="{54F8602D-ACBD-5315-3F96-87FC4AA1726B}"/>
+          </ac:spMkLst>
+        </pc:spChg>
+      </pc:sldChg>
+    </pc:docChg>
+  </pc:docChgLst>
+</pc:chgInfo>
 </file>
 
 <file path=ppt/notesMasters/notesMaster1.xml><?xml version="1.0" encoding="utf-8"?>
@@ -205,7 +239,7 @@
           <a:p>
             <a:fld id="{FFE43D65-6CB0-4F0B-AC30-1424A11CD4C6}" type="datetimeFigureOut">
               <a:rPr lang="en-US" smtClean="0"/>
-              <a:t>2/11/2026</a:t>
+              <a:t>2/12/2026</a:t>
             </a:fld>
             <a:endParaRPr lang="en-US"/>
           </a:p>
@@ -1189,7 +1223,7 @@
           <a:p>
             <a:fld id="{ABAF9593-C674-46EE-A627-D0710901FD0E}" type="datetimeFigureOut">
               <a:rPr lang="en-US" smtClean="0"/>
-              <a:t>2/11/2026</a:t>
+              <a:t>2/12/2026</a:t>
             </a:fld>
             <a:endParaRPr lang="en-US"/>
           </a:p>
@@ -1387,7 +1421,7 @@
           <a:p>
             <a:fld id="{ABAF9593-C674-46EE-A627-D0710901FD0E}" type="datetimeFigureOut">
               <a:rPr lang="en-US" smtClean="0"/>
-              <a:t>2/11/2026</a:t>
+              <a:t>2/12/2026</a:t>
             </a:fld>
             <a:endParaRPr lang="en-US"/>
           </a:p>
@@ -1595,7 +1629,7 @@
           <a:p>
             <a:fld id="{ABAF9593-C674-46EE-A627-D0710901FD0E}" type="datetimeFigureOut">
               <a:rPr lang="en-US" smtClean="0"/>
-              <a:t>2/11/2026</a:t>
+              <a:t>2/12/2026</a:t>
             </a:fld>
             <a:endParaRPr lang="en-US"/>
           </a:p>
@@ -1793,7 +1827,7 @@
           <a:p>
             <a:fld id="{ABAF9593-C674-46EE-A627-D0710901FD0E}" type="datetimeFigureOut">
               <a:rPr lang="en-US" smtClean="0"/>
-              <a:t>2/11/2026</a:t>
+              <a:t>2/12/2026</a:t>
             </a:fld>
             <a:endParaRPr lang="en-US"/>
           </a:p>
@@ -2068,7 +2102,7 @@
           <a:p>
             <a:fld id="{ABAF9593-C674-46EE-A627-D0710901FD0E}" type="datetimeFigureOut">
               <a:rPr lang="en-US" smtClean="0"/>
-              <a:t>2/11/2026</a:t>
+              <a:t>2/12/2026</a:t>
             </a:fld>
             <a:endParaRPr lang="en-US"/>
           </a:p>
@@ -2333,7 +2367,7 @@
           <a:p>
             <a:fld id="{ABAF9593-C674-46EE-A627-D0710901FD0E}" type="datetimeFigureOut">
               <a:rPr lang="en-US" smtClean="0"/>
-              <a:t>2/11/2026</a:t>
+              <a:t>2/12/2026</a:t>
             </a:fld>
             <a:endParaRPr lang="en-US"/>
           </a:p>
@@ -2745,7 +2779,7 @@
           <a:p>
             <a:fld id="{ABAF9593-C674-46EE-A627-D0710901FD0E}" type="datetimeFigureOut">
               <a:rPr lang="en-US" smtClean="0"/>
-              <a:t>2/11/2026</a:t>
+              <a:t>2/12/2026</a:t>
             </a:fld>
             <a:endParaRPr lang="en-US"/>
           </a:p>
@@ -2886,7 +2920,7 @@
           <a:p>
             <a:fld id="{ABAF9593-C674-46EE-A627-D0710901FD0E}" type="datetimeFigureOut">
               <a:rPr lang="en-US" smtClean="0"/>
-              <a:t>2/11/2026</a:t>
+              <a:t>2/12/2026</a:t>
             </a:fld>
             <a:endParaRPr lang="en-US"/>
           </a:p>
@@ -2999,7 +3033,7 @@
           <a:p>
             <a:fld id="{ABAF9593-C674-46EE-A627-D0710901FD0E}" type="datetimeFigureOut">
               <a:rPr lang="en-US" smtClean="0"/>
-              <a:t>2/11/2026</a:t>
+              <a:t>2/12/2026</a:t>
             </a:fld>
             <a:endParaRPr lang="en-US"/>
           </a:p>
@@ -3310,7 +3344,7 @@
           <a:p>
             <a:fld id="{ABAF9593-C674-46EE-A627-D0710901FD0E}" type="datetimeFigureOut">
               <a:rPr lang="en-US" smtClean="0"/>
-              <a:t>2/11/2026</a:t>
+              <a:t>2/12/2026</a:t>
             </a:fld>
             <a:endParaRPr lang="en-US"/>
           </a:p>
@@ -3598,7 +3632,7 @@
           <a:p>
             <a:fld id="{ABAF9593-C674-46EE-A627-D0710901FD0E}" type="datetimeFigureOut">
               <a:rPr lang="en-US" smtClean="0"/>
-              <a:t>2/11/2026</a:t>
+              <a:t>2/12/2026</a:t>
             </a:fld>
             <a:endParaRPr lang="en-US"/>
           </a:p>
@@ -3839,7 +3873,7 @@
           <a:p>
             <a:fld id="{ABAF9593-C674-46EE-A627-D0710901FD0E}" type="datetimeFigureOut">
               <a:rPr lang="en-US" smtClean="0"/>
-              <a:t>2/11/2026</a:t>
+              <a:t>2/12/2026</a:t>
             </a:fld>
             <a:endParaRPr lang="en-US"/>
           </a:p>
@@ -5089,7 +5123,7 @@
           <a:p>
             <a:r>
               <a:rPr lang="en-US" sz="1800" dirty="0"/>
-              <a:t>This third presentation focuses on AI Command Line Interface (CLI)</a:t>
+              <a:t>This second presentation focuses on AI agents</a:t>
             </a:r>
           </a:p>
           <a:p>
@@ -5156,7 +5190,7 @@
               <a:rPr lang="en-US" sz="1800" dirty="0">
                 <a:latin typeface="Aptos Body"/>
               </a:rPr>
-              <a:t>The second presentation explores:</a:t>
+              <a:t>The third presentation explores:</a:t>
             </a:r>
           </a:p>
           <a:p>
@@ -5165,7 +5199,7 @@
               <a:rPr lang="en-US" sz="1800" dirty="0">
                 <a:latin typeface="Aptos Body"/>
               </a:rPr>
-              <a:t>AI Agents</a:t>
+              <a:t>AI Consoles</a:t>
             </a:r>
           </a:p>
           <a:p>
@@ -5174,16 +5208,7 @@
               <a:rPr lang="en-US" sz="1800" dirty="0">
                 <a:latin typeface="Aptos Body"/>
               </a:rPr>
-              <a:t>Use local application to communicate with remote LLM</a:t>
-            </a:r>
-          </a:p>
-          <a:p>
-            <a:pPr lvl="1"/>
-            <a:r>
-              <a:rPr lang="en-US" sz="1800" dirty="0">
-                <a:latin typeface="Aptos Body"/>
-              </a:rPr>
-              <a:t>Uses HTTPS-based API</a:t>
+              <a:t>Uses HTTPS-based API to communicate with remote LLM</a:t>
             </a:r>
           </a:p>
           <a:p>
@@ -5194,6 +5219,30 @@
               </a:rPr>
               <a:t>Can read from and write to local file system</a:t>
             </a:r>
+          </a:p>
+          <a:p>
+            <a:pPr lvl="1"/>
+            <a:r>
+              <a:rPr lang="en-US" sz="1800">
+                <a:latin typeface="Aptos Body"/>
+              </a:rPr>
+              <a:t>Must restart to </a:t>
+            </a:r>
+            <a:r>
+              <a:rPr lang="en-US" sz="1800" dirty="0">
+                <a:latin typeface="Aptos Body"/>
+              </a:rPr>
+              <a:t>change current </a:t>
+            </a:r>
+            <a:r>
+              <a:rPr lang="en-US" sz="1800">
+                <a:latin typeface="Aptos Body"/>
+              </a:rPr>
+              <a:t>working directory</a:t>
+            </a:r>
+            <a:endParaRPr lang="en-US" sz="1800" dirty="0">
+              <a:latin typeface="Aptos Body"/>
+            </a:endParaRPr>
           </a:p>
         </p:txBody>
       </p:sp>

</xml_diff>